<commit_message>
created tables and dispatch fn
tables are relational - but not backref yet - will update after discussion.
dispatch structure is ready but will require some discussion as well
</commit_message>
<xml_diff>
--- a/AUTO DOCS/db_notes.pptx
+++ b/AUTO DOCS/db_notes.pptx
@@ -105,6 +105,11 @@
       </a:defRPr>
     </a:lvl9pPr>
   </p:defaultTextStyle>
+  <p:extLst>
+    <p:ext uri="{EFAFB233-063F-42B5-8137-9DF3F51BA10A}">
+      <p15:sldGuideLst xmlns:p15="http://schemas.microsoft.com/office/powerpoint/2012/main"/>
+    </p:ext>
+  </p:extLst>
 </p:presentation>
 </file>
 
@@ -255,7 +260,7 @@
           <a:p>
             <a:fld id="{8B73E824-B0AA-FE41-992F-BF11ECCD88D3}" type="datetimeFigureOut">
               <a:rPr lang="en-US" smtClean="0"/>
-              <a:t>1/29/23</a:t>
+              <a:t>2/5/23</a:t>
             </a:fld>
             <a:endParaRPr lang="en-US"/>
           </a:p>
@@ -453,7 +458,7 @@
           <a:p>
             <a:fld id="{8B73E824-B0AA-FE41-992F-BF11ECCD88D3}" type="datetimeFigureOut">
               <a:rPr lang="en-US" smtClean="0"/>
-              <a:t>1/29/23</a:t>
+              <a:t>2/5/23</a:t>
             </a:fld>
             <a:endParaRPr lang="en-US"/>
           </a:p>
@@ -661,7 +666,7 @@
           <a:p>
             <a:fld id="{8B73E824-B0AA-FE41-992F-BF11ECCD88D3}" type="datetimeFigureOut">
               <a:rPr lang="en-US" smtClean="0"/>
-              <a:t>1/29/23</a:t>
+              <a:t>2/5/23</a:t>
             </a:fld>
             <a:endParaRPr lang="en-US"/>
           </a:p>
@@ -859,7 +864,7 @@
           <a:p>
             <a:fld id="{8B73E824-B0AA-FE41-992F-BF11ECCD88D3}" type="datetimeFigureOut">
               <a:rPr lang="en-US" smtClean="0"/>
-              <a:t>1/29/23</a:t>
+              <a:t>2/5/23</a:t>
             </a:fld>
             <a:endParaRPr lang="en-US"/>
           </a:p>
@@ -1134,7 +1139,7 @@
           <a:p>
             <a:fld id="{8B73E824-B0AA-FE41-992F-BF11ECCD88D3}" type="datetimeFigureOut">
               <a:rPr lang="en-US" smtClean="0"/>
-              <a:t>1/29/23</a:t>
+              <a:t>2/5/23</a:t>
             </a:fld>
             <a:endParaRPr lang="en-US"/>
           </a:p>
@@ -1399,7 +1404,7 @@
           <a:p>
             <a:fld id="{8B73E824-B0AA-FE41-992F-BF11ECCD88D3}" type="datetimeFigureOut">
               <a:rPr lang="en-US" smtClean="0"/>
-              <a:t>1/29/23</a:t>
+              <a:t>2/5/23</a:t>
             </a:fld>
             <a:endParaRPr lang="en-US"/>
           </a:p>
@@ -1811,7 +1816,7 @@
           <a:p>
             <a:fld id="{8B73E824-B0AA-FE41-992F-BF11ECCD88D3}" type="datetimeFigureOut">
               <a:rPr lang="en-US" smtClean="0"/>
-              <a:t>1/29/23</a:t>
+              <a:t>2/5/23</a:t>
             </a:fld>
             <a:endParaRPr lang="en-US"/>
           </a:p>
@@ -1952,7 +1957,7 @@
           <a:p>
             <a:fld id="{8B73E824-B0AA-FE41-992F-BF11ECCD88D3}" type="datetimeFigureOut">
               <a:rPr lang="en-US" smtClean="0"/>
-              <a:t>1/29/23</a:t>
+              <a:t>2/5/23</a:t>
             </a:fld>
             <a:endParaRPr lang="en-US"/>
           </a:p>
@@ -2065,7 +2070,7 @@
           <a:p>
             <a:fld id="{8B73E824-B0AA-FE41-992F-BF11ECCD88D3}" type="datetimeFigureOut">
               <a:rPr lang="en-US" smtClean="0"/>
-              <a:t>1/29/23</a:t>
+              <a:t>2/5/23</a:t>
             </a:fld>
             <a:endParaRPr lang="en-US"/>
           </a:p>
@@ -2376,7 +2381,7 @@
           <a:p>
             <a:fld id="{8B73E824-B0AA-FE41-992F-BF11ECCD88D3}" type="datetimeFigureOut">
               <a:rPr lang="en-US" smtClean="0"/>
-              <a:t>1/29/23</a:t>
+              <a:t>2/5/23</a:t>
             </a:fld>
             <a:endParaRPr lang="en-US"/>
           </a:p>
@@ -2664,7 +2669,7 @@
           <a:p>
             <a:fld id="{8B73E824-B0AA-FE41-992F-BF11ECCD88D3}" type="datetimeFigureOut">
               <a:rPr lang="en-US" smtClean="0"/>
-              <a:t>1/29/23</a:t>
+              <a:t>2/5/23</a:t>
             </a:fld>
             <a:endParaRPr lang="en-US"/>
           </a:p>
@@ -2905,7 +2910,7 @@
           <a:p>
             <a:fld id="{8B73E824-B0AA-FE41-992F-BF11ECCD88D3}" type="datetimeFigureOut">
               <a:rPr lang="en-US" smtClean="0"/>
-              <a:t>1/29/23</a:t>
+              <a:t>2/5/23</a:t>
             </a:fld>
             <a:endParaRPr lang="en-US"/>
           </a:p>
@@ -3428,14 +3433,14 @@
           <p:nvPr>
             <p:extLst>
               <p:ext uri="{D42A27DB-BD31-4B8C-83A1-F6EECF244321}">
-                <p14:modId xmlns:p14="http://schemas.microsoft.com/office/powerpoint/2010/main" val="721368789"/>
+                <p14:modId xmlns:p14="http://schemas.microsoft.com/office/powerpoint/2010/main" val="398060869"/>
               </p:ext>
             </p:extLst>
           </p:nvPr>
         </p:nvGraphicFramePr>
         <p:xfrm>
           <a:off x="363220" y="239607"/>
-          <a:ext cx="1534160" cy="2133600"/>
+          <a:ext cx="1534160" cy="2438400"/>
         </p:xfrm>
         <a:graphic>
           <a:graphicData uri="http://schemas.openxmlformats.org/drawingml/2006/table">
@@ -3857,6 +3862,65 @@
                 <a:extLst>
                   <a:ext uri="{0D108BD9-81ED-4DB2-BD59-A6C34878D82A}">
                     <a16:rowId xmlns:a16="http://schemas.microsoft.com/office/drawing/2014/main" val="1104291462"/>
+                  </a:ext>
+                </a:extLst>
+              </a:tr>
+              <a:tr h="230971">
+                <a:tc>
+                  <a:txBody>
+                    <a:bodyPr/>
+                    <a:lstStyle/>
+                    <a:p>
+                      <a:r>
+                        <a:rPr lang="en-US" sz="1400" dirty="0" err="1"/>
+                        <a:t>owner_id</a:t>
+                      </a:r>
+                      <a:endParaRPr lang="en-US" sz="1400" dirty="0"/>
+                    </a:p>
+                  </a:txBody>
+                  <a:tcPr>
+                    <a:lnL w="12700" cap="flat" cmpd="sng" algn="ctr">
+                      <a:solidFill>
+                        <a:schemeClr val="tx1"/>
+                      </a:solidFill>
+                      <a:prstDash val="solid"/>
+                      <a:round/>
+                      <a:headEnd type="none" w="med" len="med"/>
+                      <a:tailEnd type="none" w="med" len="med"/>
+                    </a:lnL>
+                    <a:lnR w="12700" cap="flat" cmpd="sng" algn="ctr">
+                      <a:solidFill>
+                        <a:schemeClr val="tx1"/>
+                      </a:solidFill>
+                      <a:prstDash val="solid"/>
+                      <a:round/>
+                      <a:headEnd type="none" w="med" len="med"/>
+                      <a:tailEnd type="none" w="med" len="med"/>
+                    </a:lnR>
+                    <a:lnT w="12700" cap="flat" cmpd="sng" algn="ctr">
+                      <a:solidFill>
+                        <a:schemeClr val="tx1"/>
+                      </a:solidFill>
+                      <a:prstDash val="solid"/>
+                      <a:round/>
+                      <a:headEnd type="none" w="med" len="med"/>
+                      <a:tailEnd type="none" w="med" len="med"/>
+                    </a:lnT>
+                    <a:lnB w="12700" cap="flat" cmpd="sng" algn="ctr">
+                      <a:solidFill>
+                        <a:schemeClr val="tx1"/>
+                      </a:solidFill>
+                      <a:prstDash val="solid"/>
+                      <a:round/>
+                      <a:headEnd type="none" w="med" len="med"/>
+                      <a:tailEnd type="none" w="med" len="med"/>
+                    </a:lnB>
+                    <a:noFill/>
+                  </a:tcPr>
+                </a:tc>
+                <a:extLst>
+                  <a:ext uri="{0D108BD9-81ED-4DB2-BD59-A6C34878D82A}">
+                    <a16:rowId xmlns:a16="http://schemas.microsoft.com/office/drawing/2014/main" val="172713664"/>
                   </a:ext>
                 </a:extLst>
               </a:tr>
@@ -4273,7 +4337,7 @@
           <p:nvPr>
             <p:extLst>
               <p:ext uri="{D42A27DB-BD31-4B8C-83A1-F6EECF244321}">
-                <p14:modId xmlns:p14="http://schemas.microsoft.com/office/powerpoint/2010/main" val="3785849063"/>
+                <p14:modId xmlns:p14="http://schemas.microsoft.com/office/powerpoint/2010/main" val="254757423"/>
               </p:ext>
             </p:extLst>
           </p:nvPr>
@@ -4480,6 +4544,64 @@
                     <a:p>
                       <a:r>
                         <a:rPr lang="en-US" sz="1400" dirty="0"/>
+                        <a:t>description</a:t>
+                      </a:r>
+                    </a:p>
+                  </a:txBody>
+                  <a:tcPr>
+                    <a:lnL w="12700" cap="flat" cmpd="sng" algn="ctr">
+                      <a:solidFill>
+                        <a:schemeClr val="tx1"/>
+                      </a:solidFill>
+                      <a:prstDash val="solid"/>
+                      <a:round/>
+                      <a:headEnd type="none" w="med" len="med"/>
+                      <a:tailEnd type="none" w="med" len="med"/>
+                    </a:lnL>
+                    <a:lnR w="12700" cap="flat" cmpd="sng" algn="ctr">
+                      <a:solidFill>
+                        <a:schemeClr val="tx1"/>
+                      </a:solidFill>
+                      <a:prstDash val="solid"/>
+                      <a:round/>
+                      <a:headEnd type="none" w="med" len="med"/>
+                      <a:tailEnd type="none" w="med" len="med"/>
+                    </a:lnR>
+                    <a:lnT w="12700" cap="flat" cmpd="sng" algn="ctr">
+                      <a:solidFill>
+                        <a:schemeClr val="tx1"/>
+                      </a:solidFill>
+                      <a:prstDash val="solid"/>
+                      <a:round/>
+                      <a:headEnd type="none" w="med" len="med"/>
+                      <a:tailEnd type="none" w="med" len="med"/>
+                    </a:lnT>
+                    <a:lnB w="12700" cap="flat" cmpd="sng" algn="ctr">
+                      <a:solidFill>
+                        <a:schemeClr val="tx1"/>
+                      </a:solidFill>
+                      <a:prstDash val="solid"/>
+                      <a:round/>
+                      <a:headEnd type="none" w="med" len="med"/>
+                      <a:tailEnd type="none" w="med" len="med"/>
+                    </a:lnB>
+                    <a:noFill/>
+                  </a:tcPr>
+                </a:tc>
+                <a:extLst>
+                  <a:ext uri="{0D108BD9-81ED-4DB2-BD59-A6C34878D82A}">
+                    <a16:rowId xmlns:a16="http://schemas.microsoft.com/office/drawing/2014/main" val="541595401"/>
+                  </a:ext>
+                </a:extLst>
+              </a:tr>
+              <a:tr h="230971">
+                <a:tc>
+                  <a:txBody>
+                    <a:bodyPr/>
+                    <a:lstStyle/>
+                    <a:p>
+                      <a:r>
+                        <a:rPr lang="en-US" sz="1400" dirty="0"/>
                         <a:t>key</a:t>
                       </a:r>
                     </a:p>
@@ -4597,65 +4719,6 @@
                     <a:p>
                       <a:r>
                         <a:rPr lang="en-US" sz="1400" dirty="0" err="1"/>
-                        <a:t>owner_type</a:t>
-                      </a:r>
-                      <a:endParaRPr lang="en-US" sz="1400" dirty="0"/>
-                    </a:p>
-                  </a:txBody>
-                  <a:tcPr>
-                    <a:lnL w="12700" cap="flat" cmpd="sng" algn="ctr">
-                      <a:solidFill>
-                        <a:schemeClr val="tx1"/>
-                      </a:solidFill>
-                      <a:prstDash val="solid"/>
-                      <a:round/>
-                      <a:headEnd type="none" w="med" len="med"/>
-                      <a:tailEnd type="none" w="med" len="med"/>
-                    </a:lnL>
-                    <a:lnR w="12700" cap="flat" cmpd="sng" algn="ctr">
-                      <a:solidFill>
-                        <a:schemeClr val="tx1"/>
-                      </a:solidFill>
-                      <a:prstDash val="solid"/>
-                      <a:round/>
-                      <a:headEnd type="none" w="med" len="med"/>
-                      <a:tailEnd type="none" w="med" len="med"/>
-                    </a:lnR>
-                    <a:lnT w="12700" cap="flat" cmpd="sng" algn="ctr">
-                      <a:solidFill>
-                        <a:schemeClr val="tx1"/>
-                      </a:solidFill>
-                      <a:prstDash val="solid"/>
-                      <a:round/>
-                      <a:headEnd type="none" w="med" len="med"/>
-                      <a:tailEnd type="none" w="med" len="med"/>
-                    </a:lnT>
-                    <a:lnB w="12700" cap="flat" cmpd="sng" algn="ctr">
-                      <a:solidFill>
-                        <a:schemeClr val="tx1"/>
-                      </a:solidFill>
-                      <a:prstDash val="solid"/>
-                      <a:round/>
-                      <a:headEnd type="none" w="med" len="med"/>
-                      <a:tailEnd type="none" w="med" len="med"/>
-                    </a:lnB>
-                    <a:noFill/>
-                  </a:tcPr>
-                </a:tc>
-                <a:extLst>
-                  <a:ext uri="{0D108BD9-81ED-4DB2-BD59-A6C34878D82A}">
-                    <a16:rowId xmlns:a16="http://schemas.microsoft.com/office/drawing/2014/main" val="519309597"/>
-                  </a:ext>
-                </a:extLst>
-              </a:tr>
-              <a:tr h="230971">
-                <a:tc>
-                  <a:txBody>
-                    <a:bodyPr/>
-                    <a:lstStyle/>
-                    <a:p>
-                      <a:r>
-                        <a:rPr lang="en-US" sz="1400" dirty="0" err="1"/>
                         <a:t>url</a:t>
                       </a:r>
                       <a:endParaRPr lang="en-US" sz="1400" dirty="0"/>
@@ -4900,7 +4963,7 @@
           <p:nvPr>
             <p:extLst>
               <p:ext uri="{D42A27DB-BD31-4B8C-83A1-F6EECF244321}">
-                <p14:modId xmlns:p14="http://schemas.microsoft.com/office/powerpoint/2010/main" val="2397903551"/>
+                <p14:modId xmlns:p14="http://schemas.microsoft.com/office/powerpoint/2010/main" val="2516866727"/>
               </p:ext>
             </p:extLst>
           </p:nvPr>
@@ -4931,7 +4994,7 @@
                     <a:lstStyle/>
                     <a:p>
                       <a:r>
-                        <a:rPr lang="en-US" sz="1400" b="1" dirty="0"/>
+                        <a:rPr lang="en-US" sz="1400" b="1" strike="sngStrike" dirty="0"/>
                         <a:t>models</a:t>
                       </a:r>
                     </a:p>
@@ -4989,7 +5052,7 @@
                     <a:lstStyle/>
                     <a:p>
                       <a:r>
-                        <a:rPr lang="en-US" sz="1400" dirty="0"/>
+                        <a:rPr lang="en-US" sz="1400" strike="sngStrike" dirty="0"/>
                         <a:t>id</a:t>
                       </a:r>
                     </a:p>
@@ -5047,7 +5110,7 @@
                     <a:lstStyle/>
                     <a:p>
                       <a:r>
-                        <a:rPr lang="en-US" sz="1400" dirty="0"/>
+                        <a:rPr lang="en-US" sz="1400" strike="sngStrike" dirty="0"/>
                         <a:t>name</a:t>
                       </a:r>
                     </a:p>
@@ -5105,7 +5168,7 @@
                     <a:lstStyle/>
                     <a:p>
                       <a:r>
-                        <a:rPr lang="en-US" sz="1400" dirty="0"/>
+                        <a:rPr lang="en-US" sz="1400" strike="sngStrike" dirty="0"/>
                         <a:t>description</a:t>
                       </a:r>
                     </a:p>
@@ -5163,7 +5226,7 @@
                     <a:lstStyle/>
                     <a:p>
                       <a:r>
-                        <a:rPr lang="en-US" sz="1400" dirty="0"/>
+                        <a:rPr lang="en-US" sz="1400" strike="sngStrike" dirty="0"/>
                         <a:t>notes</a:t>
                       </a:r>
                     </a:p>
@@ -5221,10 +5284,10 @@
                     <a:lstStyle/>
                     <a:p>
                       <a:r>
-                        <a:rPr lang="en-US" sz="1400" dirty="0" err="1"/>
+                        <a:rPr lang="en-US" sz="1400" strike="sngStrike" dirty="0" err="1"/>
                         <a:t>api_id</a:t>
                       </a:r>
-                      <a:endParaRPr lang="en-US" sz="1400" dirty="0"/>
+                      <a:endParaRPr lang="en-US" sz="1400" strike="sngStrike" dirty="0"/>
                     </a:p>
                   </a:txBody>
                   <a:tcPr>
@@ -5292,7 +5355,7 @@
           <p:nvPr>
             <p:extLst>
               <p:ext uri="{D42A27DB-BD31-4B8C-83A1-F6EECF244321}">
-                <p14:modId xmlns:p14="http://schemas.microsoft.com/office/powerpoint/2010/main" val="756968567"/>
+                <p14:modId xmlns:p14="http://schemas.microsoft.com/office/powerpoint/2010/main" val="538415350"/>
               </p:ext>
             </p:extLst>
           </p:nvPr>
@@ -5498,10 +5561,10 @@
                     <a:lstStyle/>
                     <a:p>
                       <a:r>
-                        <a:rPr lang="en-US" sz="1400" dirty="0" err="1"/>
+                        <a:rPr lang="en-US" sz="1400" strike="sngStrike" dirty="0" err="1"/>
                         <a:t>model_id</a:t>
                       </a:r>
-                      <a:endParaRPr lang="en-US" sz="1400" dirty="0"/>
+                      <a:endParaRPr lang="en-US" sz="1400" strike="sngStrike" dirty="0"/>
                     </a:p>
                   </a:txBody>
                   <a:tcPr>
@@ -6078,7 +6141,7 @@
           <p:nvPr>
             <p:extLst>
               <p:ext uri="{D42A27DB-BD31-4B8C-83A1-F6EECF244321}">
-                <p14:modId xmlns:p14="http://schemas.microsoft.com/office/powerpoint/2010/main" val="1865709680"/>
+                <p14:modId xmlns:p14="http://schemas.microsoft.com/office/powerpoint/2010/main" val="1258488236"/>
               </p:ext>
             </p:extLst>
           </p:nvPr>
@@ -6109,7 +6172,7 @@
                     <a:lstStyle/>
                     <a:p>
                       <a:r>
-                        <a:rPr lang="en-US" sz="1400" b="1" dirty="0"/>
+                        <a:rPr lang="en-US" sz="1400" b="1" strike="sngStrike" dirty="0"/>
                         <a:t>logs</a:t>
                       </a:r>
                     </a:p>
@@ -6167,7 +6230,7 @@
                     <a:lstStyle/>
                     <a:p>
                       <a:r>
-                        <a:rPr lang="en-US" sz="1400" dirty="0"/>
+                        <a:rPr lang="en-US" sz="1400" strike="sngStrike" dirty="0"/>
                         <a:t>id</a:t>
                       </a:r>
                     </a:p>
@@ -6225,7 +6288,7 @@
                     <a:lstStyle/>
                     <a:p>
                       <a:r>
-                        <a:rPr lang="en-US" sz="1400" dirty="0"/>
+                        <a:rPr lang="en-US" sz="1400" strike="sngStrike" dirty="0"/>
                         <a:t>type</a:t>
                       </a:r>
                     </a:p>
@@ -6283,10 +6346,10 @@
                     <a:lstStyle/>
                     <a:p>
                       <a:r>
-                        <a:rPr lang="en-US" sz="1400" dirty="0" err="1"/>
+                        <a:rPr lang="en-US" sz="1400" strike="sngStrike" dirty="0" err="1"/>
                         <a:t>job_id</a:t>
                       </a:r>
-                      <a:endParaRPr lang="en-US" sz="1400" dirty="0"/>
+                      <a:endParaRPr lang="en-US" sz="1400" strike="sngStrike" dirty="0"/>
                     </a:p>
                   </a:txBody>
                   <a:tcPr>
@@ -6342,7 +6405,7 @@
                     <a:lstStyle/>
                     <a:p>
                       <a:r>
-                        <a:rPr lang="en-US" sz="1400" dirty="0"/>
+                        <a:rPr lang="en-US" sz="1400" strike="sngStrike" dirty="0"/>
                         <a:t>name</a:t>
                       </a:r>
                     </a:p>
@@ -6400,7 +6463,7 @@
                     <a:lstStyle/>
                     <a:p>
                       <a:r>
-                        <a:rPr lang="en-US" sz="1400" dirty="0"/>
+                        <a:rPr lang="en-US" sz="1400" strike="sngStrike" dirty="0"/>
                         <a:t>description</a:t>
                       </a:r>
                     </a:p>

</xml_diff>